<commit_message>
add mail to presentation
</commit_message>
<xml_diff>
--- a/ctai-compile_time_assembly_interpreter.pptx
+++ b/ctai-compile_time_assembly_interpreter.pptx
@@ -21,8 +21,8 @@
     <p:sldId id="275" r:id="rId12"/>
     <p:sldId id="276" r:id="rId13"/>
     <p:sldId id="270" r:id="rId14"/>
-    <p:sldId id="272" r:id="rId15"/>
-    <p:sldId id="271" r:id="rId16"/>
+    <p:sldId id="271" r:id="rId15"/>
+    <p:sldId id="272" r:id="rId16"/>
     <p:sldId id="264" r:id="rId17"/>
   </p:sldIdLst>
   <p:sldSz cx="12192000" cy="6858000"/>
@@ -216,7 +216,7 @@
           <a:p>
             <a:fld id="{0354D649-3166-4642-8FF1-8704FB462AF1}" type="datetimeFigureOut">
               <a:rPr lang="pl-PL" smtClean="0"/>
-              <a:t>26.11.2017</a:t>
+              <a:t>29.11.2017</a:t>
             </a:fld>
             <a:endParaRPr lang="pl-PL"/>
           </a:p>
@@ -669,7 +669,7 @@
             <a:fld id="{8E36636D-D922-432D-A958-524484B5923D}" type="datetimeFigureOut">
               <a:rPr lang="en-US" dirty="0"/>
               <a:pPr/>
-              <a:t>11/26/2017</a:t>
+              <a:t>11/29/2017</a:t>
             </a:fld>
             <a:endParaRPr lang="en-US" dirty="0"/>
           </a:p>
@@ -963,7 +963,7 @@
           <a:p>
             <a:fld id="{48A87A34-81AB-432B-8DAE-1953F412C126}" type="datetimeFigureOut">
               <a:rPr lang="en-US" dirty="0"/>
-              <a:t>11/26/2017</a:t>
+              <a:t>11/29/2017</a:t>
             </a:fld>
             <a:endParaRPr lang="en-US" dirty="0"/>
           </a:p>
@@ -1150,7 +1150,7 @@
           <a:p>
             <a:fld id="{48A87A34-81AB-432B-8DAE-1953F412C126}" type="datetimeFigureOut">
               <a:rPr lang="en-US" dirty="0"/>
-              <a:t>11/26/2017</a:t>
+              <a:t>11/29/2017</a:t>
             </a:fld>
             <a:endParaRPr lang="en-US" dirty="0"/>
           </a:p>
@@ -1406,7 +1406,7 @@
           <a:p>
             <a:fld id="{48A87A34-81AB-432B-8DAE-1953F412C126}" type="datetimeFigureOut">
               <a:rPr lang="en-US" dirty="0"/>
-              <a:t>11/26/2017</a:t>
+              <a:t>11/29/2017</a:t>
             </a:fld>
             <a:endParaRPr lang="en-US" dirty="0"/>
           </a:p>
@@ -1825,7 +1825,7 @@
           <a:p>
             <a:fld id="{48A87A34-81AB-432B-8DAE-1953F412C126}" type="datetimeFigureOut">
               <a:rPr lang="en-US" dirty="0"/>
-              <a:t>11/26/2017</a:t>
+              <a:t>11/29/2017</a:t>
             </a:fld>
             <a:endParaRPr lang="en-US" dirty="0"/>
           </a:p>
@@ -2357,7 +2357,7 @@
           <a:p>
             <a:fld id="{48A87A34-81AB-432B-8DAE-1953F412C126}" type="datetimeFigureOut">
               <a:rPr lang="en-US" dirty="0"/>
-              <a:t>11/26/2017</a:t>
+              <a:t>11/29/2017</a:t>
             </a:fld>
             <a:endParaRPr lang="en-US" dirty="0"/>
           </a:p>
@@ -3216,7 +3216,7 @@
           <a:p>
             <a:fld id="{48A87A34-81AB-432B-8DAE-1953F412C126}" type="datetimeFigureOut">
               <a:rPr lang="en-US" dirty="0"/>
-              <a:t>11/26/2017</a:t>
+              <a:t>11/29/2017</a:t>
             </a:fld>
             <a:endParaRPr lang="en-US" dirty="0"/>
           </a:p>
@@ -3382,7 +3382,7 @@
             <a:fld id="{8E36636D-D922-432D-A958-524484B5923D}" type="datetimeFigureOut">
               <a:rPr lang="en-US" dirty="0"/>
               <a:pPr/>
-              <a:t>11/26/2017</a:t>
+              <a:t>11/29/2017</a:t>
             </a:fld>
             <a:endParaRPr lang="en-US" dirty="0"/>
           </a:p>
@@ -3563,7 +3563,7 @@
             <a:fld id="{8E36636D-D922-432D-A958-524484B5923D}" type="datetimeFigureOut">
               <a:rPr lang="en-US" dirty="0"/>
               <a:pPr/>
-              <a:t>11/26/2017</a:t>
+              <a:t>11/29/2017</a:t>
             </a:fld>
             <a:endParaRPr lang="en-US" dirty="0"/>
           </a:p>
@@ -3730,7 +3730,7 @@
             <a:fld id="{8E36636D-D922-432D-A958-524484B5923D}" type="datetimeFigureOut">
               <a:rPr lang="en-US" dirty="0"/>
               <a:pPr/>
-              <a:t>11/26/2017</a:t>
+              <a:t>11/29/2017</a:t>
             </a:fld>
             <a:endParaRPr lang="en-US" dirty="0"/>
           </a:p>
@@ -3971,7 +3971,7 @@
             <a:fld id="{8E36636D-D922-432D-A958-524484B5923D}" type="datetimeFigureOut">
               <a:rPr lang="en-US" dirty="0"/>
               <a:pPr/>
-              <a:t>11/26/2017</a:t>
+              <a:t>11/29/2017</a:t>
             </a:fld>
             <a:endParaRPr lang="en-US" dirty="0"/>
           </a:p>
@@ -4204,7 +4204,7 @@
             <a:fld id="{8E36636D-D922-432D-A958-524484B5923D}" type="datetimeFigureOut">
               <a:rPr lang="en-US" dirty="0"/>
               <a:pPr/>
-              <a:t>11/26/2017</a:t>
+              <a:t>11/29/2017</a:t>
             </a:fld>
             <a:endParaRPr lang="en-US" dirty="0"/>
           </a:p>
@@ -4667,7 +4667,7 @@
             <a:fld id="{8E36636D-D922-432D-A958-524484B5923D}" type="datetimeFigureOut">
               <a:rPr lang="en-US" dirty="0"/>
               <a:pPr/>
-              <a:t>11/26/2017</a:t>
+              <a:t>11/29/2017</a:t>
             </a:fld>
             <a:endParaRPr lang="en-US" dirty="0"/>
           </a:p>
@@ -4782,7 +4782,7 @@
             <a:fld id="{8E36636D-D922-432D-A958-524484B5923D}" type="datetimeFigureOut">
               <a:rPr lang="en-US" dirty="0"/>
               <a:pPr/>
-              <a:t>11/26/2017</a:t>
+              <a:t>11/29/2017</a:t>
             </a:fld>
             <a:endParaRPr lang="en-US" dirty="0"/>
           </a:p>
@@ -4874,7 +4874,7 @@
             <a:fld id="{8E36636D-D922-432D-A958-524484B5923D}" type="datetimeFigureOut">
               <a:rPr lang="en-US" dirty="0"/>
               <a:pPr/>
-              <a:t>11/26/2017</a:t>
+              <a:t>11/29/2017</a:t>
             </a:fld>
             <a:endParaRPr lang="en-US" dirty="0"/>
           </a:p>
@@ -5126,7 +5126,7 @@
             <a:fld id="{8E36636D-D922-432D-A958-524484B5923D}" type="datetimeFigureOut">
               <a:rPr lang="en-US" dirty="0"/>
               <a:pPr/>
-              <a:t>11/26/2017</a:t>
+              <a:t>11/29/2017</a:t>
             </a:fld>
             <a:endParaRPr lang="en-US" dirty="0"/>
           </a:p>
@@ -5423,7 +5423,7 @@
             <a:fld id="{8E36636D-D922-432D-A958-524484B5923D}" type="datetimeFigureOut">
               <a:rPr lang="en-US" dirty="0"/>
               <a:pPr/>
-              <a:t>11/26/2017</a:t>
+              <a:t>11/29/2017</a:t>
             </a:fld>
             <a:endParaRPr lang="en-US" dirty="0"/>
           </a:p>
@@ -5654,7 +5654,7 @@
             <a:fld id="{8E36636D-D922-432D-A958-524484B5923D}" type="datetimeFigureOut">
               <a:rPr lang="en-US" dirty="0"/>
               <a:pPr/>
-              <a:t>11/26/2017</a:t>
+              <a:t>11/29/2017</a:t>
             </a:fld>
             <a:endParaRPr lang="en-US" dirty="0"/>
           </a:p>
@@ -6401,14 +6401,19 @@
             <p:ph type="subTitle" idx="1"/>
           </p:nvPr>
         </p:nvSpPr>
-        <p:spPr/>
+        <p:spPr>
+          <a:xfrm>
+            <a:off x="1370693" y="3598339"/>
+            <a:ext cx="9440034" cy="1049867"/>
+          </a:xfrm>
+        </p:spPr>
         <p:txBody>
           <a:bodyPr/>
           <a:lstStyle/>
           <a:p>
             <a:r>
               <a:rPr lang="pl-PL" dirty="0"/>
-              <a:t>Mateusz Janek | 29.11.2017 | Wro.cpp</a:t>
+              <a:t>Mateusz Janek &lt;mateusz.janek6@gmail.com&gt; | Wro.cpp| 29.11.2017</a:t>
             </a:r>
           </a:p>
         </p:txBody>
@@ -6468,7 +6473,15 @@
           <a:p>
             <a:r>
               <a:rPr lang="pl-PL" dirty="0" err="1"/>
-              <a:t>Algorithm</a:t>
+              <a:t>ctai</a:t>
+            </a:r>
+            <a:r>
+              <a:rPr lang="pl-PL" dirty="0"/>
+              <a:t> </a:t>
+            </a:r>
+            <a:r>
+              <a:rPr lang="pl-PL" dirty="0" err="1"/>
+              <a:t>code</a:t>
             </a:r>
             <a:endParaRPr lang="pl-PL" dirty="0"/>
           </a:p>
@@ -7062,15 +7075,15 @@
           <a:p>
             <a:r>
               <a:rPr lang="pl-PL" dirty="0" err="1"/>
-              <a:t>Questions</a:t>
+              <a:t>Code</a:t>
             </a:r>
             <a:r>
               <a:rPr lang="pl-PL" dirty="0"/>
-              <a:t>/</a:t>
+              <a:t> &amp; </a:t>
             </a:r>
             <a:r>
               <a:rPr lang="pl-PL" dirty="0" err="1"/>
-              <a:t>discussion</a:t>
+              <a:t>presentation</a:t>
             </a:r>
             <a:endParaRPr lang="pl-PL" dirty="0"/>
           </a:p>
@@ -7092,21 +7105,129 @@
             <p:ph idx="1"/>
           </p:nvPr>
         </p:nvSpPr>
-        <p:spPr/>
+        <p:spPr>
+          <a:xfrm>
+            <a:off x="913795" y="1732449"/>
+            <a:ext cx="10353762" cy="4058751"/>
+          </a:xfrm>
+        </p:spPr>
         <p:txBody>
           <a:bodyPr>
             <a:normAutofit/>
           </a:bodyPr>
           <a:lstStyle/>
           <a:p>
-            <a:endParaRPr lang="pl-PL" sz="1700" dirty="0"/>
-          </a:p>
-        </p:txBody>
-      </p:sp>
+            <a:pPr marL="36900" indent="0" algn="ctr">
+              <a:buNone/>
+            </a:pPr>
+            <a:endParaRPr lang="pl-PL" sz="2800" dirty="0">
+              <a:hlinkClick r:id="rId2" action="ppaction://hlinkfile"/>
+            </a:endParaRPr>
+          </a:p>
+          <a:p>
+            <a:pPr marL="36900" indent="0" algn="ctr">
+              <a:buNone/>
+            </a:pPr>
+            <a:endParaRPr lang="pl-PL" sz="2800" dirty="0">
+              <a:hlinkClick r:id="rId2" action="ppaction://hlinkfile"/>
+            </a:endParaRPr>
+          </a:p>
+          <a:p>
+            <a:pPr marL="36900" indent="0" algn="ctr">
+              <a:buNone/>
+            </a:pPr>
+            <a:endParaRPr lang="pl-PL" sz="2800" dirty="0">
+              <a:hlinkClick r:id="rId2" action="ppaction://hlinkfile"/>
+            </a:endParaRPr>
+          </a:p>
+          <a:p>
+            <a:pPr marL="36900" indent="0" algn="ctr">
+              <a:buNone/>
+            </a:pPr>
+            <a:endParaRPr lang="pl-PL" sz="2800" dirty="0">
+              <a:hlinkClick r:id="rId2" action="ppaction://hlinkfile"/>
+            </a:endParaRPr>
+          </a:p>
+          <a:p>
+            <a:pPr marL="36900" indent="0" algn="ctr">
+              <a:buNone/>
+            </a:pPr>
+            <a:endParaRPr lang="pl-PL" sz="2800">
+              <a:hlinkClick r:id="rId2" action="ppaction://hlinkfile"/>
+            </a:endParaRPr>
+          </a:p>
+          <a:p>
+            <a:pPr marL="36900" indent="0" algn="ctr">
+              <a:buNone/>
+            </a:pPr>
+            <a:r>
+              <a:rPr lang="en-US" sz="2800">
+                <a:hlinkClick r:id="rId2" action="ppaction://hlinkfile"/>
+              </a:rPr>
+              <a:t>github</a:t>
+            </a:r>
+            <a:r>
+              <a:rPr lang="en-US" sz="2800" dirty="0">
+                <a:hlinkClick r:id="rId2" action="ppaction://hlinkfile"/>
+              </a:rPr>
+              <a:t>.com/</a:t>
+            </a:r>
+            <a:r>
+              <a:rPr lang="en-US" sz="2800" dirty="0" err="1">
+                <a:hlinkClick r:id="rId2" action="ppaction://hlinkfile"/>
+              </a:rPr>
+              <a:t>stryku</a:t>
+            </a:r>
+            <a:r>
+              <a:rPr lang="en-US" sz="2800" dirty="0">
+                <a:hlinkClick r:id="rId2" action="ppaction://hlinkfile"/>
+              </a:rPr>
+              <a:t>/workshops/tree/master/</a:t>
+            </a:r>
+            <a:r>
+              <a:rPr lang="en-US" sz="2800" dirty="0" err="1">
+                <a:hlinkClick r:id="rId2" action="ppaction://hlinkfile"/>
+              </a:rPr>
+              <a:t>ctai</a:t>
+            </a:r>
+            <a:endParaRPr lang="pl-PL" sz="2800" dirty="0"/>
+          </a:p>
+        </p:txBody>
+      </p:sp>
+      <p:pic>
+        <p:nvPicPr>
+          <p:cNvPr id="7" name="Obraz 6">
+            <a:extLst>
+              <a:ext uri="{FF2B5EF4-FFF2-40B4-BE49-F238E27FC236}">
+                <a16:creationId xmlns:a16="http://schemas.microsoft.com/office/drawing/2014/main" id="{79F136F9-BC4F-4972-9441-BEA12830474B}"/>
+              </a:ext>
+            </a:extLst>
+          </p:cNvPr>
+          <p:cNvPicPr>
+            <a:picLocks noChangeAspect="1"/>
+          </p:cNvPicPr>
+          <p:nvPr/>
+        </p:nvPicPr>
+        <p:blipFill>
+          <a:blip r:embed="rId3"/>
+          <a:stretch>
+            <a:fillRect/>
+          </a:stretch>
+        </p:blipFill>
+        <p:spPr>
+          <a:xfrm>
+            <a:off x="4921871" y="1732449"/>
+            <a:ext cx="2337609" cy="2337609"/>
+          </a:xfrm>
+          <a:prstGeom prst="rect">
+            <a:avLst/>
+          </a:prstGeom>
+        </p:spPr>
+      </p:pic>
     </p:spTree>
     <p:extLst>
       <p:ext uri="{BB962C8B-B14F-4D97-AF65-F5344CB8AC3E}">
-        <p14:creationId xmlns:p14="http://schemas.microsoft.com/office/powerpoint/2010/main" val="3330681429"/>
+        <p14:creationId xmlns:p14="http://schemas.microsoft.com/office/powerpoint/2010/main" val="568904150"/>
       </p:ext>
     </p:extLst>
   </p:cSld>
@@ -7156,15 +7277,15 @@
           <a:p>
             <a:r>
               <a:rPr lang="pl-PL" dirty="0" err="1"/>
-              <a:t>Code</a:t>
+              <a:t>Questions</a:t>
             </a:r>
             <a:r>
               <a:rPr lang="pl-PL" dirty="0"/>
-              <a:t> &amp; </a:t>
+              <a:t>/</a:t>
             </a:r>
             <a:r>
               <a:rPr lang="pl-PL" dirty="0" err="1"/>
-              <a:t>presentation</a:t>
+              <a:t>discussion</a:t>
             </a:r>
             <a:endParaRPr lang="pl-PL" dirty="0"/>
           </a:p>
@@ -7186,57 +7307,21 @@
             <p:ph idx="1"/>
           </p:nvPr>
         </p:nvSpPr>
-        <p:spPr>
-          <a:xfrm>
-            <a:off x="913795" y="1732449"/>
-            <a:ext cx="10353762" cy="4058751"/>
-          </a:xfrm>
-        </p:spPr>
+        <p:spPr/>
         <p:txBody>
           <a:bodyPr>
             <a:normAutofit/>
           </a:bodyPr>
           <a:lstStyle/>
           <a:p>
-            <a:pPr marL="36900" indent="0" algn="ctr">
-              <a:buNone/>
-            </a:pPr>
-            <a:endParaRPr lang="pl-PL" sz="2800" dirty="0">
-              <a:hlinkClick r:id="rId2"/>
-            </a:endParaRPr>
-          </a:p>
-          <a:p>
-            <a:pPr marL="36900" indent="0" algn="ctr">
-              <a:buNone/>
-            </a:pPr>
-            <a:endParaRPr lang="pl-PL" sz="2800" dirty="0">
-              <a:hlinkClick r:id="rId2"/>
-            </a:endParaRPr>
-          </a:p>
-          <a:p>
-            <a:pPr marL="36900" indent="0" algn="ctr">
-              <a:buNone/>
-            </a:pPr>
-            <a:r>
-              <a:rPr lang="pl-PL" sz="2800" dirty="0">
-                <a:hlinkClick r:id="rId2"/>
-              </a:rPr>
-              <a:t>https://</a:t>
-            </a:r>
-            <a:r>
-              <a:rPr lang="pl-PL" sz="2800" dirty="0">
-                <a:hlinkClick r:id="rId2"/>
-              </a:rPr>
-              <a:t>github.com/stryku/workshops/tree/master/ctai_wro_cpp</a:t>
-            </a:r>
-            <a:endParaRPr lang="pl-PL" sz="2800" dirty="0"/>
+            <a:endParaRPr lang="pl-PL" sz="1700" dirty="0"/>
           </a:p>
         </p:txBody>
       </p:sp>
     </p:spTree>
     <p:extLst>
       <p:ext uri="{BB962C8B-B14F-4D97-AF65-F5344CB8AC3E}">
-        <p14:creationId xmlns:p14="http://schemas.microsoft.com/office/powerpoint/2010/main" val="568904150"/>
+        <p14:creationId xmlns:p14="http://schemas.microsoft.com/office/powerpoint/2010/main" val="3330681429"/>
       </p:ext>
     </p:extLst>
   </p:cSld>
@@ -7741,7 +7826,7 @@
         </p:blipFill>
         <p:spPr>
           <a:xfrm>
-            <a:off x="4080901" y="3173398"/>
+            <a:off x="7076147" y="2569660"/>
             <a:ext cx="4019550" cy="2457450"/>
           </a:xfrm>
           <a:prstGeom prst="rect">
@@ -7771,8 +7856,8 @@
         </p:blipFill>
         <p:spPr>
           <a:xfrm>
-            <a:off x="1613416" y="1610310"/>
-            <a:ext cx="1202307" cy="1091325"/>
+            <a:off x="1601693" y="2569660"/>
+            <a:ext cx="2707360" cy="2457450"/>
           </a:xfrm>
           <a:prstGeom prst="rect">
             <a:avLst/>
@@ -7786,6 +7871,45 @@
           </a:effectLst>
         </p:spPr>
       </p:pic>
+      <p:cxnSp>
+        <p:nvCxnSpPr>
+          <p:cNvPr id="5" name="Łącznik prosty ze strzałką 4">
+            <a:extLst>
+              <a:ext uri="{FF2B5EF4-FFF2-40B4-BE49-F238E27FC236}">
+                <a16:creationId xmlns:a16="http://schemas.microsoft.com/office/drawing/2014/main" id="{9A42DF3A-B240-48CE-917E-4B9237DE7DCB}"/>
+              </a:ext>
+            </a:extLst>
+          </p:cNvPr>
+          <p:cNvCxnSpPr/>
+          <p:nvPr/>
+        </p:nvCxnSpPr>
+        <p:spPr>
+          <a:xfrm>
+            <a:off x="4648200" y="3798385"/>
+            <a:ext cx="2124000" cy="0"/>
+          </a:xfrm>
+          <a:prstGeom prst="straightConnector1">
+            <a:avLst/>
+          </a:prstGeom>
+          <a:ln>
+            <a:tailEnd type="triangle"/>
+          </a:ln>
+        </p:spPr>
+        <p:style>
+          <a:lnRef idx="3">
+            <a:schemeClr val="accent1"/>
+          </a:lnRef>
+          <a:fillRef idx="0">
+            <a:schemeClr val="accent1"/>
+          </a:fillRef>
+          <a:effectRef idx="2">
+            <a:schemeClr val="accent1"/>
+          </a:effectRef>
+          <a:fontRef idx="minor">
+            <a:schemeClr val="tx1"/>
+          </a:fontRef>
+        </p:style>
+      </p:cxnSp>
     </p:spTree>
     <p:extLst>
       <p:ext uri="{BB962C8B-B14F-4D97-AF65-F5344CB8AC3E}">
@@ -7871,7 +7995,7 @@
         </p:blipFill>
         <p:spPr>
           <a:xfrm>
-            <a:off x="4357126" y="3163043"/>
+            <a:off x="6836617" y="3163042"/>
             <a:ext cx="3467100" cy="1857375"/>
           </a:xfrm>
           <a:prstGeom prst="rect">
@@ -7938,14 +8062,53 @@
         </p:blipFill>
         <p:spPr>
           <a:xfrm>
-            <a:off x="3771438" y="1580050"/>
-            <a:ext cx="1785035" cy="1091325"/>
+            <a:off x="1545752" y="3163042"/>
+            <a:ext cx="3038031" cy="1857375"/>
           </a:xfrm>
           <a:prstGeom prst="rect">
             <a:avLst/>
           </a:prstGeom>
         </p:spPr>
       </p:pic>
+      <p:cxnSp>
+        <p:nvCxnSpPr>
+          <p:cNvPr id="6" name="Łącznik prosty ze strzałką 5">
+            <a:extLst>
+              <a:ext uri="{FF2B5EF4-FFF2-40B4-BE49-F238E27FC236}">
+                <a16:creationId xmlns:a16="http://schemas.microsoft.com/office/drawing/2014/main" id="{3B18B4F4-251A-43E6-A447-D842F4054092}"/>
+              </a:ext>
+            </a:extLst>
+          </p:cNvPr>
+          <p:cNvCxnSpPr/>
+          <p:nvPr/>
+        </p:nvCxnSpPr>
+        <p:spPr>
+          <a:xfrm>
+            <a:off x="4648200" y="3798385"/>
+            <a:ext cx="2124000" cy="0"/>
+          </a:xfrm>
+          <a:prstGeom prst="straightConnector1">
+            <a:avLst/>
+          </a:prstGeom>
+          <a:ln>
+            <a:tailEnd type="triangle"/>
+          </a:ln>
+        </p:spPr>
+        <p:style>
+          <a:lnRef idx="3">
+            <a:schemeClr val="accent1"/>
+          </a:lnRef>
+          <a:fillRef idx="0">
+            <a:schemeClr val="accent1"/>
+          </a:fillRef>
+          <a:effectRef idx="2">
+            <a:schemeClr val="accent1"/>
+          </a:effectRef>
+          <a:fontRef idx="minor">
+            <a:schemeClr val="tx1"/>
+          </a:fontRef>
+        </p:style>
+      </p:cxnSp>
     </p:spTree>
     <p:extLst>
       <p:ext uri="{BB962C8B-B14F-4D97-AF65-F5344CB8AC3E}">
@@ -8031,7 +8194,7 @@
         </p:blipFill>
         <p:spPr>
           <a:xfrm>
-            <a:off x="5314388" y="2980058"/>
+            <a:off x="7641750" y="3091427"/>
             <a:ext cx="1552575" cy="1971675"/>
           </a:xfrm>
           <a:prstGeom prst="rect">
@@ -8128,14 +8291,53 @@
         </p:blipFill>
         <p:spPr>
           <a:xfrm>
-            <a:off x="6512188" y="1580050"/>
-            <a:ext cx="2037140" cy="1091325"/>
+            <a:off x="1613416" y="3091428"/>
+            <a:ext cx="3680460" cy="1971675"/>
           </a:xfrm>
           <a:prstGeom prst="rect">
             <a:avLst/>
           </a:prstGeom>
         </p:spPr>
       </p:pic>
+      <p:cxnSp>
+        <p:nvCxnSpPr>
+          <p:cNvPr id="7" name="Łącznik prosty ze strzałką 6">
+            <a:extLst>
+              <a:ext uri="{FF2B5EF4-FFF2-40B4-BE49-F238E27FC236}">
+                <a16:creationId xmlns:a16="http://schemas.microsoft.com/office/drawing/2014/main" id="{A004E628-4383-4DF4-8859-A84B019C7E69}"/>
+              </a:ext>
+            </a:extLst>
+          </p:cNvPr>
+          <p:cNvCxnSpPr/>
+          <p:nvPr/>
+        </p:nvCxnSpPr>
+        <p:spPr>
+          <a:xfrm>
+            <a:off x="5405813" y="3933201"/>
+            <a:ext cx="2124000" cy="0"/>
+          </a:xfrm>
+          <a:prstGeom prst="straightConnector1">
+            <a:avLst/>
+          </a:prstGeom>
+          <a:ln>
+            <a:tailEnd type="triangle"/>
+          </a:ln>
+        </p:spPr>
+        <p:style>
+          <a:lnRef idx="3">
+            <a:schemeClr val="accent1"/>
+          </a:lnRef>
+          <a:fillRef idx="0">
+            <a:schemeClr val="accent1"/>
+          </a:fillRef>
+          <a:effectRef idx="2">
+            <a:schemeClr val="accent1"/>
+          </a:effectRef>
+          <a:fontRef idx="minor">
+            <a:schemeClr val="tx1"/>
+          </a:fontRef>
+        </p:style>
+      </p:cxnSp>
     </p:spTree>
     <p:extLst>
       <p:ext uri="{BB962C8B-B14F-4D97-AF65-F5344CB8AC3E}">

</xml_diff>